<commit_message>
Edit Board and BoardDao -> FactoryPattern, Capsulation
</commit_message>
<xml_diff>
--- a/study-note/자바/2022-08-10 내용정리.pptx
+++ b/study-note/자바/2022-08-10 내용정리.pptx
@@ -5,11 +5,12 @@
     <p:sldMasterId id="2147483648" r:id="rId1"/>
   </p:sldMasterIdLst>
   <p:notesMasterIdLst>
-    <p:notesMasterId r:id="rId4"/>
+    <p:notesMasterId r:id="rId5"/>
   </p:notesMasterIdLst>
   <p:sldIdLst>
     <p:sldId id="256" r:id="rId2"/>
     <p:sldId id="286" r:id="rId3"/>
+    <p:sldId id="288" r:id="rId4"/>
   </p:sldIdLst>
   <p:sldSz cx="12192000" cy="6858000"/>
   <p:notesSz cx="6858000" cy="9144000"/>
@@ -3769,10 +3770,1860 @@
           <a:chExt cx="0" cy="0"/>
         </a:xfrm>
       </p:grpSpPr>
+      <p:graphicFrame>
+        <p:nvGraphicFramePr>
+          <p:cNvPr id="3" name="표 3">
+            <a:extLst>
+              <a:ext uri="{FF2B5EF4-FFF2-40B4-BE49-F238E27FC236}">
+                <a16:creationId xmlns:a16="http://schemas.microsoft.com/office/drawing/2014/main" id="{A812CA5C-6943-A998-C7C2-ACA3910C84C8}"/>
+              </a:ext>
+            </a:extLst>
+          </p:cNvPr>
+          <p:cNvGraphicFramePr>
+            <a:graphicFrameLocks noGrp="1"/>
+          </p:cNvGraphicFramePr>
+          <p:nvPr>
+            <p:extLst>
+              <p:ext uri="{D42A27DB-BD31-4B8C-83A1-F6EECF244321}">
+                <p14:modId xmlns:p14="http://schemas.microsoft.com/office/powerpoint/2010/main" val="1407464445"/>
+              </p:ext>
+            </p:extLst>
+          </p:nvPr>
+        </p:nvGraphicFramePr>
+        <p:xfrm>
+          <a:off x="140138" y="73573"/>
+          <a:ext cx="11799614" cy="6523089"/>
+        </p:xfrm>
+        <a:graphic>
+          <a:graphicData uri="http://schemas.openxmlformats.org/drawingml/2006/table">
+            <a:tbl>
+              <a:tblPr firstRow="1" bandRow="1">
+                <a:tableStyleId>{5C22544A-7EE6-4342-B048-85BDC9FD1C3A}</a:tableStyleId>
+              </a:tblPr>
+              <a:tblGrid>
+                <a:gridCol w="2476938">
+                  <a:extLst>
+                    <a:ext uri="{9D8B030D-6E8A-4147-A177-3AD203B41FA5}">
+                      <a16:colId xmlns:a16="http://schemas.microsoft.com/office/drawing/2014/main" val="1716195492"/>
+                    </a:ext>
+                  </a:extLst>
+                </a:gridCol>
+                <a:gridCol w="1145627">
+                  <a:extLst>
+                    <a:ext uri="{9D8B030D-6E8A-4147-A177-3AD203B41FA5}">
+                      <a16:colId xmlns:a16="http://schemas.microsoft.com/office/drawing/2014/main" val="172788221"/>
+                    </a:ext>
+                  </a:extLst>
+                </a:gridCol>
+                <a:gridCol w="4014952">
+                  <a:extLst>
+                    <a:ext uri="{9D8B030D-6E8A-4147-A177-3AD203B41FA5}">
+                      <a16:colId xmlns:a16="http://schemas.microsoft.com/office/drawing/2014/main" val="1102246341"/>
+                    </a:ext>
+                  </a:extLst>
+                </a:gridCol>
+                <a:gridCol w="4162097">
+                  <a:extLst>
+                    <a:ext uri="{9D8B030D-6E8A-4147-A177-3AD203B41FA5}">
+                      <a16:colId xmlns:a16="http://schemas.microsoft.com/office/drawing/2014/main" val="3584977435"/>
+                    </a:ext>
+                  </a:extLst>
+                </a:gridCol>
+              </a:tblGrid>
+              <a:tr h="412702">
+                <a:tc>
+                  <a:txBody>
+                    <a:bodyPr/>
+                    <a:lstStyle/>
+                    <a:p>
+                      <a:endParaRPr lang="ko-Kore-KR" altLang="en-US"/>
+                    </a:p>
+                  </a:txBody>
+                  <a:tcPr/>
+                </a:tc>
+                <a:tc gridSpan="2">
+                  <a:txBody>
+                    <a:bodyPr/>
+                    <a:lstStyle/>
+                    <a:p>
+                      <a:r>
+                        <a:rPr lang="en-US" altLang="ko-Kore-KR" dirty="0"/>
+                        <a:t>Byte stream (byte, byte[])</a:t>
+                      </a:r>
+                    </a:p>
+                    <a:p>
+                      <a:r>
+                        <a:rPr lang="en-US" altLang="ko-Kore-KR" dirty="0" err="1"/>
+                        <a:t>InputStream</a:t>
+                      </a:r>
+                      <a:r>
+                        <a:rPr lang="en-US" altLang="ko-Kore-KR" dirty="0"/>
+                        <a:t>/</a:t>
+                      </a:r>
+                      <a:r>
+                        <a:rPr lang="en-US" altLang="ko-Kore-KR" dirty="0" err="1"/>
+                        <a:t>OutputStream</a:t>
+                      </a:r>
+                      <a:endParaRPr lang="ko-Kore-KR" altLang="en-US" dirty="0"/>
+                    </a:p>
+                  </a:txBody>
+                  <a:tcPr/>
+                </a:tc>
+                <a:tc hMerge="1">
+                  <a:txBody>
+                    <a:bodyPr/>
+                    <a:lstStyle/>
+                    <a:p>
+                      <a:endParaRPr lang="ko-Kore-KR" altLang="en-US" dirty="0"/>
+                    </a:p>
+                  </a:txBody>
+                  <a:tcPr/>
+                </a:tc>
+                <a:tc>
+                  <a:txBody>
+                    <a:bodyPr/>
+                    <a:lstStyle/>
+                    <a:p>
+                      <a:pPr marL="0" marR="0" lvl="0" indent="0" algn="l" defTabSz="914400" rtl="0" eaLnBrk="1" fontAlgn="auto" latinLnBrk="1" hangingPunct="1">
+                        <a:lnSpc>
+                          <a:spcPct val="100000"/>
+                        </a:lnSpc>
+                        <a:spcBef>
+                          <a:spcPts val="0"/>
+                        </a:spcBef>
+                        <a:spcAft>
+                          <a:spcPts val="0"/>
+                        </a:spcAft>
+                        <a:buClrTx/>
+                        <a:buSzTx/>
+                        <a:buFontTx/>
+                        <a:buNone/>
+                        <a:tabLst/>
+                        <a:defRPr/>
+                      </a:pPr>
+                      <a:r>
+                        <a:rPr lang="en-US" altLang="ko-Kore-KR" dirty="0"/>
+                        <a:t>Character stream (char, char[])</a:t>
+                      </a:r>
+                    </a:p>
+                    <a:p>
+                      <a:pPr marL="0" marR="0" lvl="0" indent="0" algn="l" defTabSz="914400" rtl="0" eaLnBrk="1" fontAlgn="auto" latinLnBrk="1" hangingPunct="1">
+                        <a:lnSpc>
+                          <a:spcPct val="100000"/>
+                        </a:lnSpc>
+                        <a:spcBef>
+                          <a:spcPts val="0"/>
+                        </a:spcBef>
+                        <a:spcAft>
+                          <a:spcPts val="0"/>
+                        </a:spcAft>
+                        <a:buClrTx/>
+                        <a:buSzTx/>
+                        <a:buFontTx/>
+                        <a:buNone/>
+                        <a:tabLst/>
+                        <a:defRPr/>
+                      </a:pPr>
+                      <a:r>
+                        <a:rPr lang="en-US" altLang="ko-Kore-KR" dirty="0"/>
+                        <a:t>Reader/Writer</a:t>
+                      </a:r>
+                      <a:endParaRPr lang="ko-Kore-KR" altLang="en-US" dirty="0"/>
+                    </a:p>
+                    <a:p>
+                      <a:endParaRPr lang="ko-Kore-KR" altLang="en-US" dirty="0"/>
+                    </a:p>
+                  </a:txBody>
+                  <a:tcPr/>
+                </a:tc>
+                <a:extLst>
+                  <a:ext uri="{0D108BD9-81ED-4DB2-BD59-A6C34878D82A}">
+                    <a16:rowId xmlns:a16="http://schemas.microsoft.com/office/drawing/2014/main" val="1301018426"/>
+                  </a:ext>
+                </a:extLst>
+              </a:tr>
+              <a:tr h="412702">
+                <a:tc rowSpan="3">
+                  <a:txBody>
+                    <a:bodyPr/>
+                    <a:lstStyle/>
+                    <a:p>
+                      <a:r>
+                        <a:rPr lang="en-US" altLang="ko-Kore-KR" dirty="0" err="1"/>
+                        <a:t>DataSinkStream</a:t>
+                      </a:r>
+                      <a:endParaRPr lang="ko-Kore-KR" altLang="en-US" dirty="0"/>
+                    </a:p>
+                  </a:txBody>
+                  <a:tcPr/>
+                </a:tc>
+                <a:tc>
+                  <a:txBody>
+                    <a:bodyPr/>
+                    <a:lstStyle/>
+                    <a:p>
+                      <a:r>
+                        <a:rPr lang="ko-Kore-KR" altLang="en-US" dirty="0"/>
+                        <a:t>파일</a:t>
+                      </a:r>
+                    </a:p>
+                  </a:txBody>
+                  <a:tcPr/>
+                </a:tc>
+                <a:tc>
+                  <a:txBody>
+                    <a:bodyPr/>
+                    <a:lstStyle/>
+                    <a:p>
+                      <a:r>
+                        <a:rPr lang="en-US" altLang="ko-Kore-KR" dirty="0" err="1"/>
+                        <a:t>FileInputStream</a:t>
+                      </a:r>
+                      <a:r>
+                        <a:rPr lang="en-US" altLang="ko-Kore-KR" dirty="0"/>
+                        <a:t>/</a:t>
+                      </a:r>
+                    </a:p>
+                    <a:p>
+                      <a:r>
+                        <a:rPr lang="en-US" altLang="ko-Kore-KR" dirty="0" err="1"/>
+                        <a:t>FileoutoutStream</a:t>
+                      </a:r>
+                      <a:endParaRPr lang="ko-Kore-KR" altLang="en-US" dirty="0"/>
+                    </a:p>
+                  </a:txBody>
+                  <a:tcPr/>
+                </a:tc>
+                <a:tc>
+                  <a:txBody>
+                    <a:bodyPr/>
+                    <a:lstStyle/>
+                    <a:p>
+                      <a:r>
+                        <a:rPr lang="en-US" altLang="ko-Kore-KR" dirty="0" err="1"/>
+                        <a:t>FileReader</a:t>
+                      </a:r>
+                      <a:r>
+                        <a:rPr lang="en-US" altLang="ko-Kore-KR" dirty="0"/>
+                        <a:t>/</a:t>
+                      </a:r>
+                      <a:r>
+                        <a:rPr lang="en-US" altLang="ko-Kore-KR" dirty="0" err="1"/>
+                        <a:t>FileWriter</a:t>
+                      </a:r>
+                      <a:endParaRPr lang="ko-Kore-KR" altLang="en-US" dirty="0"/>
+                    </a:p>
+                  </a:txBody>
+                  <a:tcPr/>
+                </a:tc>
+                <a:extLst>
+                  <a:ext uri="{0D108BD9-81ED-4DB2-BD59-A6C34878D82A}">
+                    <a16:rowId xmlns:a16="http://schemas.microsoft.com/office/drawing/2014/main" val="3910152146"/>
+                  </a:ext>
+                </a:extLst>
+              </a:tr>
+              <a:tr h="412702">
+                <a:tc vMerge="1">
+                  <a:txBody>
+                    <a:bodyPr/>
+                    <a:lstStyle/>
+                    <a:p>
+                      <a:endParaRPr lang="ko-Kore-KR" altLang="en-US" dirty="0"/>
+                    </a:p>
+                  </a:txBody>
+                  <a:tcPr/>
+                </a:tc>
+                <a:tc>
+                  <a:txBody>
+                    <a:bodyPr/>
+                    <a:lstStyle/>
+                    <a:p>
+                      <a:r>
+                        <a:rPr lang="ko-Kore-KR" altLang="en-US" dirty="0"/>
+                        <a:t>메모리</a:t>
+                      </a:r>
+                    </a:p>
+                  </a:txBody>
+                  <a:tcPr/>
+                </a:tc>
+                <a:tc>
+                  <a:txBody>
+                    <a:bodyPr/>
+                    <a:lstStyle/>
+                    <a:p>
+                      <a:pPr marL="0" marR="0" lvl="0" indent="0" algn="l" defTabSz="914400" rtl="0" eaLnBrk="1" fontAlgn="auto" latinLnBrk="1" hangingPunct="1">
+                        <a:lnSpc>
+                          <a:spcPct val="100000"/>
+                        </a:lnSpc>
+                        <a:spcBef>
+                          <a:spcPts val="0"/>
+                        </a:spcBef>
+                        <a:spcAft>
+                          <a:spcPts val="0"/>
+                        </a:spcAft>
+                        <a:buClrTx/>
+                        <a:buSzTx/>
+                        <a:buFontTx/>
+                        <a:buNone/>
+                        <a:tabLst/>
+                        <a:defRPr/>
+                      </a:pPr>
+                      <a:r>
+                        <a:rPr lang="en-US" altLang="ko-Kore-KR" dirty="0" err="1"/>
+                        <a:t>ByteArrayInputArray</a:t>
+                      </a:r>
+                      <a:r>
+                        <a:rPr lang="en-US" altLang="ko-Kore-KR" dirty="0"/>
+                        <a:t>/</a:t>
+                      </a:r>
+                    </a:p>
+                    <a:p>
+                      <a:pPr marL="0" marR="0" lvl="0" indent="0" algn="l" defTabSz="914400" rtl="0" eaLnBrk="1" fontAlgn="auto" latinLnBrk="1" hangingPunct="1">
+                        <a:lnSpc>
+                          <a:spcPct val="100000"/>
+                        </a:lnSpc>
+                        <a:spcBef>
+                          <a:spcPts val="0"/>
+                        </a:spcBef>
+                        <a:spcAft>
+                          <a:spcPts val="0"/>
+                        </a:spcAft>
+                        <a:buClrTx/>
+                        <a:buSzTx/>
+                        <a:buFontTx/>
+                        <a:buNone/>
+                        <a:tabLst/>
+                        <a:defRPr/>
+                      </a:pPr>
+                      <a:r>
+                        <a:rPr lang="en-US" altLang="ko-Kore-KR" dirty="0" err="1"/>
+                        <a:t>ByteArrayOutputArray</a:t>
+                      </a:r>
+                      <a:endParaRPr lang="ko-Kore-KR" altLang="en-US" dirty="0"/>
+                    </a:p>
+                  </a:txBody>
+                  <a:tcPr/>
+                </a:tc>
+                <a:tc>
+                  <a:txBody>
+                    <a:bodyPr/>
+                    <a:lstStyle/>
+                    <a:p>
+                      <a:pPr marL="285750" indent="-285750">
+                        <a:buFont typeface="Arial" panose="020B0604020202020204" pitchFamily="34" charset="0"/>
+                        <a:buChar char="•"/>
+                      </a:pPr>
+                      <a:r>
+                        <a:rPr lang="en-US" altLang="ko-Kore-KR" dirty="0" err="1"/>
+                        <a:t>CharArrayReader</a:t>
+                      </a:r>
+                      <a:r>
+                        <a:rPr lang="en-US" altLang="ko-Kore-KR" dirty="0"/>
+                        <a:t>/</a:t>
+                      </a:r>
+                      <a:r>
+                        <a:rPr lang="en-US" altLang="ko-Kore-KR" dirty="0" err="1"/>
+                        <a:t>CharArrayWriter</a:t>
+                      </a:r>
+                      <a:endParaRPr lang="en-US" altLang="ko-Kore-KR" dirty="0"/>
+                    </a:p>
+                    <a:p>
+                      <a:pPr marL="285750" indent="-285750">
+                        <a:buFont typeface="Arial" panose="020B0604020202020204" pitchFamily="34" charset="0"/>
+                        <a:buChar char="•"/>
+                      </a:pPr>
+                      <a:r>
+                        <a:rPr lang="en-US" altLang="ko-Kore-KR" dirty="0" err="1"/>
+                        <a:t>StringReader</a:t>
+                      </a:r>
+                      <a:r>
+                        <a:rPr lang="en-US" altLang="ko-Kore-KR" dirty="0"/>
+                        <a:t>/</a:t>
+                      </a:r>
+                      <a:r>
+                        <a:rPr lang="en-US" altLang="ko-Kore-KR" dirty="0" err="1"/>
+                        <a:t>StringWriter</a:t>
+                      </a:r>
+                      <a:endParaRPr lang="ko-Kore-KR" altLang="en-US" dirty="0"/>
+                    </a:p>
+                  </a:txBody>
+                  <a:tcPr/>
+                </a:tc>
+                <a:extLst>
+                  <a:ext uri="{0D108BD9-81ED-4DB2-BD59-A6C34878D82A}">
+                    <a16:rowId xmlns:a16="http://schemas.microsoft.com/office/drawing/2014/main" val="3709600419"/>
+                  </a:ext>
+                </a:extLst>
+              </a:tr>
+              <a:tr h="412702">
+                <a:tc vMerge="1">
+                  <a:txBody>
+                    <a:bodyPr/>
+                    <a:lstStyle/>
+                    <a:p>
+                      <a:endParaRPr lang="ko-Kore-KR" altLang="en-US" dirty="0"/>
+                    </a:p>
+                  </a:txBody>
+                  <a:tcPr/>
+                </a:tc>
+                <a:tc>
+                  <a:txBody>
+                    <a:bodyPr/>
+                    <a:lstStyle/>
+                    <a:p>
+                      <a:r>
+                        <a:rPr lang="ko-Kore-KR" altLang="en-US" dirty="0"/>
+                        <a:t>프로세스</a:t>
+                      </a:r>
+                    </a:p>
+                  </a:txBody>
+                  <a:tcPr/>
+                </a:tc>
+                <a:tc>
+                  <a:txBody>
+                    <a:bodyPr/>
+                    <a:lstStyle/>
+                    <a:p>
+                      <a:r>
+                        <a:rPr lang="en-US" altLang="ko-Kore-KR" dirty="0" err="1"/>
+                        <a:t>PipedInputStream</a:t>
+                      </a:r>
+                      <a:r>
+                        <a:rPr lang="en-US" altLang="ko-Kore-KR" dirty="0"/>
+                        <a:t>/</a:t>
+                      </a:r>
+                    </a:p>
+                    <a:p>
+                      <a:r>
+                        <a:rPr lang="en-US" altLang="ko-Kore-KR" dirty="0" err="1"/>
+                        <a:t>PipedOutputStream</a:t>
+                      </a:r>
+                      <a:endParaRPr lang="ko-Kore-KR" altLang="en-US" dirty="0"/>
+                    </a:p>
+                  </a:txBody>
+                  <a:tcPr/>
+                </a:tc>
+                <a:tc>
+                  <a:txBody>
+                    <a:bodyPr/>
+                    <a:lstStyle/>
+                    <a:p>
+                      <a:r>
+                        <a:rPr lang="en-US" altLang="ko-Kore-KR" dirty="0" err="1"/>
+                        <a:t>PipedReader</a:t>
+                      </a:r>
+                      <a:r>
+                        <a:rPr lang="en-US" altLang="ko-Kore-KR" dirty="0"/>
+                        <a:t>/</a:t>
+                      </a:r>
+                      <a:r>
+                        <a:rPr lang="en-US" altLang="ko-Kore-KR" dirty="0" err="1"/>
+                        <a:t>PipedWriter</a:t>
+                      </a:r>
+                      <a:endParaRPr lang="ko-Kore-KR" altLang="en-US" dirty="0"/>
+                    </a:p>
+                  </a:txBody>
+                  <a:tcPr/>
+                </a:tc>
+                <a:extLst>
+                  <a:ext uri="{0D108BD9-81ED-4DB2-BD59-A6C34878D82A}">
+                    <a16:rowId xmlns:a16="http://schemas.microsoft.com/office/drawing/2014/main" val="1397656307"/>
+                  </a:ext>
+                </a:extLst>
+              </a:tr>
+              <a:tr h="770060">
+                <a:tc rowSpan="2">
+                  <a:txBody>
+                    <a:bodyPr/>
+                    <a:lstStyle/>
+                    <a:p>
+                      <a:r>
+                        <a:rPr lang="en-US" altLang="ko-Kore-KR" dirty="0" err="1"/>
+                        <a:t>DataProcessingStream</a:t>
+                      </a:r>
+                      <a:endParaRPr lang="ko-Kore-KR" altLang="en-US" dirty="0"/>
+                    </a:p>
+                  </a:txBody>
+                  <a:tcPr/>
+                </a:tc>
+                <a:tc gridSpan="2">
+                  <a:txBody>
+                    <a:bodyPr/>
+                    <a:lstStyle/>
+                    <a:p>
+                      <a:pPr marL="0" indent="0">
+                        <a:buFont typeface="Arial" panose="020B0604020202020204" pitchFamily="34" charset="0"/>
+                        <a:buNone/>
+                      </a:pPr>
+                      <a:r>
+                        <a:rPr lang="en-US" altLang="ko-Kore-KR" dirty="0" err="1"/>
+                        <a:t>PrintStream</a:t>
+                      </a:r>
+                      <a:endParaRPr lang="en-US" altLang="ko-Kore-KR" dirty="0"/>
+                    </a:p>
+                  </a:txBody>
+                  <a:tcPr/>
+                </a:tc>
+                <a:tc hMerge="1">
+                  <a:txBody>
+                    <a:bodyPr/>
+                    <a:lstStyle/>
+                    <a:p>
+                      <a:pPr marL="0" marR="0" lvl="0" indent="0" algn="l" defTabSz="914400" rtl="0" eaLnBrk="1" fontAlgn="auto" latinLnBrk="1" hangingPunct="1">
+                        <a:lnSpc>
+                          <a:spcPct val="100000"/>
+                        </a:lnSpc>
+                        <a:spcBef>
+                          <a:spcPts val="0"/>
+                        </a:spcBef>
+                        <a:spcAft>
+                          <a:spcPts val="0"/>
+                        </a:spcAft>
+                        <a:buClrTx/>
+                        <a:buSzTx/>
+                        <a:buFontTx/>
+                        <a:buNone/>
+                        <a:tabLst/>
+                        <a:defRPr/>
+                      </a:pPr>
+                      <a:endParaRPr lang="ko-Kore-KR" altLang="en-US" dirty="0"/>
+                    </a:p>
+                  </a:txBody>
+                  <a:tcPr/>
+                </a:tc>
+                <a:tc>
+                  <a:txBody>
+                    <a:bodyPr/>
+                    <a:lstStyle/>
+                    <a:p>
+                      <a:pPr marL="0" marR="0" lvl="0" indent="0" algn="l" defTabSz="914400" rtl="0" eaLnBrk="1" fontAlgn="auto" latinLnBrk="1" hangingPunct="1">
+                        <a:lnSpc>
+                          <a:spcPct val="100000"/>
+                        </a:lnSpc>
+                        <a:spcBef>
+                          <a:spcPts val="0"/>
+                        </a:spcBef>
+                        <a:spcAft>
+                          <a:spcPts val="0"/>
+                        </a:spcAft>
+                        <a:buClrTx/>
+                        <a:buSzTx/>
+                        <a:buFontTx/>
+                        <a:buNone/>
+                        <a:tabLst/>
+                        <a:defRPr/>
+                      </a:pPr>
+                      <a:r>
+                        <a:rPr lang="en-US" altLang="ko-Kore-KR" dirty="0" err="1"/>
+                        <a:t>PrintWriter</a:t>
+                      </a:r>
+                      <a:endParaRPr lang="ko-Kore-KR" altLang="en-US" dirty="0"/>
+                    </a:p>
+                    <a:p>
+                      <a:endParaRPr lang="ko-Kore-KR" altLang="en-US" dirty="0"/>
+                    </a:p>
+                  </a:txBody>
+                  <a:tcPr/>
+                </a:tc>
+                <a:extLst>
+                  <a:ext uri="{0D108BD9-81ED-4DB2-BD59-A6C34878D82A}">
+                    <a16:rowId xmlns:a16="http://schemas.microsoft.com/office/drawing/2014/main" val="1865878600"/>
+                  </a:ext>
+                </a:extLst>
+              </a:tr>
+              <a:tr h="2918389">
+                <a:tc vMerge="1">
+                  <a:txBody>
+                    <a:bodyPr/>
+                    <a:lstStyle/>
+                    <a:p>
+                      <a:endParaRPr lang="ko-Kore-KR" altLang="en-US"/>
+                    </a:p>
+                  </a:txBody>
+                  <a:tcPr/>
+                </a:tc>
+                <a:tc gridSpan="2">
+                  <a:txBody>
+                    <a:bodyPr/>
+                    <a:lstStyle/>
+                    <a:p>
+                      <a:pPr marL="285750" indent="-285750">
+                        <a:buFont typeface="Arial" panose="020B0604020202020204" pitchFamily="34" charset="0"/>
+                        <a:buChar char="•"/>
+                      </a:pPr>
+                      <a:r>
+                        <a:rPr lang="en-US" altLang="ko-Kore-KR" dirty="0" err="1"/>
+                        <a:t>DataInputStream</a:t>
+                      </a:r>
+                      <a:r>
+                        <a:rPr lang="en-US" altLang="ko-Kore-KR" dirty="0"/>
+                        <a:t>/</a:t>
+                      </a:r>
+                      <a:r>
+                        <a:rPr lang="en-US" altLang="ko-Kore-KR" dirty="0" err="1"/>
+                        <a:t>DataOutputStream</a:t>
+                      </a:r>
+                      <a:endParaRPr lang="en-US" altLang="ko-Kore-KR" dirty="0"/>
+                    </a:p>
+                    <a:p>
+                      <a:pPr marL="285750" indent="-285750">
+                        <a:buFont typeface="Arial" panose="020B0604020202020204" pitchFamily="34" charset="0"/>
+                        <a:buChar char="•"/>
+                      </a:pPr>
+                      <a:r>
+                        <a:rPr lang="en-US" altLang="ko-Kore-KR" dirty="0" err="1"/>
+                        <a:t>ObjectInputStream</a:t>
+                      </a:r>
+                      <a:r>
+                        <a:rPr lang="en-US" altLang="ko-Kore-KR" dirty="0"/>
+                        <a:t>/</a:t>
+                      </a:r>
+                      <a:r>
+                        <a:rPr lang="en-US" altLang="ko-Kore-KR" dirty="0" err="1"/>
+                        <a:t>ObjectOutputStream</a:t>
+                      </a:r>
+                      <a:endParaRPr lang="en-US" altLang="ko-Kore-KR" dirty="0"/>
+                    </a:p>
+                    <a:p>
+                      <a:pPr marL="285750" indent="-285750">
+                        <a:buFont typeface="Arial" panose="020B0604020202020204" pitchFamily="34" charset="0"/>
+                        <a:buChar char="•"/>
+                      </a:pPr>
+                      <a:r>
+                        <a:rPr lang="en-US" altLang="ko-Kore-KR" dirty="0" err="1"/>
+                        <a:t>BufferedInputStream</a:t>
+                      </a:r>
+                      <a:r>
+                        <a:rPr lang="en-US" altLang="ko-Kore-KR" dirty="0"/>
+                        <a:t>/</a:t>
+                      </a:r>
+                      <a:r>
+                        <a:rPr lang="en-US" altLang="ko-Kore-KR" dirty="0" err="1"/>
+                        <a:t>BUfferedOutputStream</a:t>
+                      </a:r>
+                      <a:endParaRPr lang="en-US" altLang="ko-Kore-KR" dirty="0"/>
+                    </a:p>
+                    <a:p>
+                      <a:pPr marL="0" indent="0">
+                        <a:buFont typeface="Arial" panose="020B0604020202020204" pitchFamily="34" charset="0"/>
+                        <a:buNone/>
+                      </a:pPr>
+                      <a:endParaRPr lang="en-US" altLang="ko-Kore-KR" dirty="0"/>
+                    </a:p>
+                  </a:txBody>
+                  <a:tcPr/>
+                </a:tc>
+                <a:tc hMerge="1">
+                  <a:txBody>
+                    <a:bodyPr/>
+                    <a:lstStyle/>
+                    <a:p>
+                      <a:endParaRPr lang="ko-Kore-KR" altLang="en-US" dirty="0"/>
+                    </a:p>
+                  </a:txBody>
+                  <a:tcPr/>
+                </a:tc>
+                <a:tc>
+                  <a:txBody>
+                    <a:bodyPr/>
+                    <a:lstStyle/>
+                    <a:p>
+                      <a:pPr marL="0" marR="0" lvl="0" indent="0" algn="l" defTabSz="914400" rtl="0" eaLnBrk="1" fontAlgn="auto" latinLnBrk="1" hangingPunct="1">
+                        <a:lnSpc>
+                          <a:spcPct val="100000"/>
+                        </a:lnSpc>
+                        <a:spcBef>
+                          <a:spcPts val="0"/>
+                        </a:spcBef>
+                        <a:spcAft>
+                          <a:spcPts val="0"/>
+                        </a:spcAft>
+                        <a:buClrTx/>
+                        <a:buSzTx/>
+                        <a:buFontTx/>
+                        <a:buNone/>
+                        <a:tabLst/>
+                        <a:defRPr/>
+                      </a:pPr>
+                      <a:r>
+                        <a:rPr lang="en-US" altLang="ko-Kore-KR" dirty="0" err="1"/>
+                        <a:t>BufferedReader</a:t>
+                      </a:r>
+                      <a:r>
+                        <a:rPr lang="en-US" altLang="ko-Kore-KR" dirty="0"/>
+                        <a:t>/</a:t>
+                      </a:r>
+                      <a:r>
+                        <a:rPr lang="en-US" altLang="ko-Kore-KR" dirty="0" err="1"/>
+                        <a:t>BufferedWriter</a:t>
+                      </a:r>
+                      <a:endParaRPr lang="ko-Kore-KR" altLang="en-US" dirty="0"/>
+                    </a:p>
+                    <a:p>
+                      <a:endParaRPr lang="ko-Kore-KR" altLang="en-US" dirty="0"/>
+                    </a:p>
+                  </a:txBody>
+                  <a:tcPr/>
+                </a:tc>
+                <a:extLst>
+                  <a:ext uri="{0D108BD9-81ED-4DB2-BD59-A6C34878D82A}">
+                    <a16:rowId xmlns:a16="http://schemas.microsoft.com/office/drawing/2014/main" val="983427389"/>
+                  </a:ext>
+                </a:extLst>
+              </a:tr>
+            </a:tbl>
+          </a:graphicData>
+        </a:graphic>
+      </p:graphicFrame>
+      <p:sp>
+        <p:nvSpPr>
+          <p:cNvPr id="4" name="아래쪽 화살표[D] 3">
+            <a:extLst>
+              <a:ext uri="{FF2B5EF4-FFF2-40B4-BE49-F238E27FC236}">
+                <a16:creationId xmlns:a16="http://schemas.microsoft.com/office/drawing/2014/main" id="{64808105-DC7D-FA8F-165B-6BB50F5F57D8}"/>
+              </a:ext>
+            </a:extLst>
+          </p:cNvPr>
+          <p:cNvSpPr/>
+          <p:nvPr/>
+        </p:nvSpPr>
+        <p:spPr>
+          <a:xfrm>
+            <a:off x="357351" y="1439918"/>
+            <a:ext cx="315311" cy="451945"/>
+          </a:xfrm>
+          <a:prstGeom prst="downArrow">
+            <a:avLst/>
+          </a:prstGeom>
+        </p:spPr>
+        <p:style>
+          <a:lnRef idx="2">
+            <a:schemeClr val="dk1">
+              <a:shade val="50000"/>
+            </a:schemeClr>
+          </a:lnRef>
+          <a:fillRef idx="1">
+            <a:schemeClr val="dk1"/>
+          </a:fillRef>
+          <a:effectRef idx="0">
+            <a:schemeClr val="dk1"/>
+          </a:effectRef>
+          <a:fontRef idx="minor">
+            <a:schemeClr val="lt1"/>
+          </a:fontRef>
+        </p:style>
+        <p:txBody>
+          <a:bodyPr rtlCol="0" anchor="ctr"/>
+          <a:lstStyle/>
+          <a:p>
+            <a:pPr algn="ctr"/>
+            <a:endParaRPr kumimoji="1" lang="ko-Kore-KR" altLang="en-US"/>
+          </a:p>
+        </p:txBody>
+      </p:sp>
+      <p:sp>
+        <p:nvSpPr>
+          <p:cNvPr id="5" name="TextBox 4">
+            <a:extLst>
+              <a:ext uri="{FF2B5EF4-FFF2-40B4-BE49-F238E27FC236}">
+                <a16:creationId xmlns:a16="http://schemas.microsoft.com/office/drawing/2014/main" id="{6093D186-330E-7184-8193-D58C72DCD8A2}"/>
+              </a:ext>
+            </a:extLst>
+          </p:cNvPr>
+          <p:cNvSpPr txBox="1"/>
+          <p:nvPr/>
+        </p:nvSpPr>
+        <p:spPr>
+          <a:xfrm>
+            <a:off x="252248" y="1975945"/>
+            <a:ext cx="1471448" cy="830997"/>
+          </a:xfrm>
+          <a:prstGeom prst="rect">
+            <a:avLst/>
+          </a:prstGeom>
+        </p:spPr>
+        <p:style>
+          <a:lnRef idx="2">
+            <a:schemeClr val="dk1"/>
+          </a:lnRef>
+          <a:fillRef idx="1">
+            <a:schemeClr val="lt1"/>
+          </a:fillRef>
+          <a:effectRef idx="0">
+            <a:schemeClr val="dk1"/>
+          </a:effectRef>
+          <a:fontRef idx="minor">
+            <a:schemeClr val="dk1"/>
+          </a:fontRef>
+        </p:style>
+        <p:txBody>
+          <a:bodyPr wrap="square" rtlCol="0">
+            <a:spAutoFit/>
+          </a:bodyPr>
+          <a:lstStyle/>
+          <a:p>
+            <a:r>
+              <a:rPr kumimoji="1" lang="ko-Kore-KR" altLang="en-US" sz="1200" dirty="0"/>
+              <a:t>데이터</a:t>
+            </a:r>
+            <a:r>
+              <a:rPr kumimoji="1" lang="ko-KR" altLang="en-US" sz="1200" dirty="0"/>
+              <a:t> 저장소에 직접 읽기</a:t>
+            </a:r>
+            <a:r>
+              <a:rPr kumimoji="1" lang="en-US" altLang="ko-KR" sz="1200" dirty="0"/>
+              <a:t>/</a:t>
+            </a:r>
+            <a:r>
+              <a:rPr kumimoji="1" lang="ko-KR" altLang="en-US" sz="1200" dirty="0"/>
+              <a:t>쓰기를 수행하는 클래스</a:t>
+            </a:r>
+            <a:endParaRPr kumimoji="1" lang="en-US" altLang="ko-KR" sz="1200" dirty="0"/>
+          </a:p>
+          <a:p>
+            <a:r>
+              <a:rPr kumimoji="1" lang="en-US" altLang="ko-KR" sz="1200" dirty="0"/>
+              <a:t>(Sink: data</a:t>
+            </a:r>
+            <a:r>
+              <a:rPr kumimoji="1" lang="ko-KR" altLang="en-US" sz="1200" dirty="0"/>
+              <a:t> 저장소</a:t>
+            </a:r>
+            <a:r>
+              <a:rPr kumimoji="1" lang="en-US" altLang="ko-KR" sz="1200" dirty="0"/>
+              <a:t>)</a:t>
+            </a:r>
+            <a:endParaRPr kumimoji="1" lang="ko-Kore-KR" altLang="en-US" sz="1200" dirty="0"/>
+          </a:p>
+        </p:txBody>
+      </p:sp>
+      <p:sp>
+        <p:nvSpPr>
+          <p:cNvPr id="6" name="아래쪽 화살표[D] 5">
+            <a:extLst>
+              <a:ext uri="{FF2B5EF4-FFF2-40B4-BE49-F238E27FC236}">
+                <a16:creationId xmlns:a16="http://schemas.microsoft.com/office/drawing/2014/main" id="{6463BC5E-1344-2D4F-FADB-2DF936758AE6}"/>
+              </a:ext>
+            </a:extLst>
+          </p:cNvPr>
+          <p:cNvSpPr/>
+          <p:nvPr/>
+        </p:nvSpPr>
+        <p:spPr>
+          <a:xfrm>
+            <a:off x="252248" y="3342291"/>
+            <a:ext cx="315311" cy="451945"/>
+          </a:xfrm>
+          <a:prstGeom prst="downArrow">
+            <a:avLst/>
+          </a:prstGeom>
+        </p:spPr>
+        <p:style>
+          <a:lnRef idx="2">
+            <a:schemeClr val="dk1">
+              <a:shade val="50000"/>
+            </a:schemeClr>
+          </a:lnRef>
+          <a:fillRef idx="1">
+            <a:schemeClr val="dk1"/>
+          </a:fillRef>
+          <a:effectRef idx="0">
+            <a:schemeClr val="dk1"/>
+          </a:effectRef>
+          <a:fontRef idx="minor">
+            <a:schemeClr val="lt1"/>
+          </a:fontRef>
+        </p:style>
+        <p:txBody>
+          <a:bodyPr rtlCol="0" anchor="ctr"/>
+          <a:lstStyle/>
+          <a:p>
+            <a:pPr algn="ctr"/>
+            <a:endParaRPr kumimoji="1" lang="ko-Kore-KR" altLang="en-US"/>
+          </a:p>
+        </p:txBody>
+      </p:sp>
+      <p:sp>
+        <p:nvSpPr>
+          <p:cNvPr id="10" name="TextBox 9">
+            <a:extLst>
+              <a:ext uri="{FF2B5EF4-FFF2-40B4-BE49-F238E27FC236}">
+                <a16:creationId xmlns:a16="http://schemas.microsoft.com/office/drawing/2014/main" id="{E7DB748B-DDA4-0EF6-6E5C-DB6AB97D2302}"/>
+              </a:ext>
+            </a:extLst>
+          </p:cNvPr>
+          <p:cNvSpPr txBox="1"/>
+          <p:nvPr/>
+        </p:nvSpPr>
+        <p:spPr>
+          <a:xfrm>
+            <a:off x="231228" y="3884989"/>
+            <a:ext cx="2312276" cy="646331"/>
+          </a:xfrm>
+          <a:prstGeom prst="rect">
+            <a:avLst/>
+          </a:prstGeom>
+        </p:spPr>
+        <p:style>
+          <a:lnRef idx="2">
+            <a:schemeClr val="dk1"/>
+          </a:lnRef>
+          <a:fillRef idx="1">
+            <a:schemeClr val="lt1"/>
+          </a:fillRef>
+          <a:effectRef idx="0">
+            <a:schemeClr val="dk1"/>
+          </a:effectRef>
+          <a:fontRef idx="minor">
+            <a:schemeClr val="dk1"/>
+          </a:fontRef>
+        </p:style>
+        <p:txBody>
+          <a:bodyPr wrap="square" rtlCol="0">
+            <a:spAutoFit/>
+          </a:bodyPr>
+          <a:lstStyle/>
+          <a:p>
+            <a:r>
+              <a:rPr kumimoji="1" lang="ko-Kore-KR" altLang="en-US" sz="1200" dirty="0"/>
+              <a:t>중간에서</a:t>
+            </a:r>
+            <a:r>
+              <a:rPr kumimoji="1" lang="ko-KR" altLang="en-US" sz="1200" dirty="0"/>
+              <a:t> 데이터를 가공하고 일을 하는 클래스</a:t>
+            </a:r>
+            <a:endParaRPr kumimoji="1" lang="en-US" altLang="ko-KR" sz="1200" dirty="0"/>
+          </a:p>
+          <a:p>
+            <a:r>
+              <a:rPr kumimoji="1" lang="en-US" altLang="ko-KR" sz="1200" dirty="0">
+                <a:sym typeface="Wingdings" pitchFamily="2" charset="2"/>
+              </a:rPr>
+              <a:t></a:t>
+            </a:r>
+            <a:r>
+              <a:rPr kumimoji="1" lang="ko-KR" altLang="en-US" sz="1200" dirty="0">
+                <a:sym typeface="Wingdings" pitchFamily="2" charset="2"/>
+              </a:rPr>
+              <a:t> </a:t>
+            </a:r>
+            <a:r>
+              <a:rPr kumimoji="1" lang="en-US" altLang="ko-KR" sz="1200" dirty="0">
+                <a:sym typeface="Wingdings" pitchFamily="2" charset="2"/>
+              </a:rPr>
+              <a:t>Decorator</a:t>
+            </a:r>
+            <a:endParaRPr kumimoji="1" lang="ko-Kore-KR" altLang="en-US" sz="1200" dirty="0"/>
+          </a:p>
+        </p:txBody>
+      </p:sp>
     </p:spTree>
     <p:extLst>
       <p:ext uri="{BB962C8B-B14F-4D97-AF65-F5344CB8AC3E}">
         <p14:creationId xmlns:p14="http://schemas.microsoft.com/office/powerpoint/2010/main" val="1508814606"/>
+      </p:ext>
+    </p:extLst>
+  </p:cSld>
+  <p:clrMapOvr>
+    <a:masterClrMapping/>
+  </p:clrMapOvr>
+</p:sld>
+</file>
+
+<file path=ppt/slides/slide3.xml><?xml version="1.0" encoding="utf-8"?>
+<p:sld xmlns:a="http://schemas.openxmlformats.org/drawingml/2006/main" xmlns:r="http://schemas.openxmlformats.org/officeDocument/2006/relationships" xmlns:p="http://schemas.openxmlformats.org/presentationml/2006/main">
+  <p:cSld>
+    <p:spTree>
+      <p:nvGrpSpPr>
+        <p:cNvPr id="1" name=""/>
+        <p:cNvGrpSpPr/>
+        <p:nvPr/>
+      </p:nvGrpSpPr>
+      <p:grpSpPr>
+        <a:xfrm>
+          <a:off x="0" y="0"/>
+          <a:ext cx="0" cy="0"/>
+          <a:chOff x="0" y="0"/>
+          <a:chExt cx="0" cy="0"/>
+        </a:xfrm>
+      </p:grpSpPr>
+      <p:sp>
+        <p:nvSpPr>
+          <p:cNvPr id="2" name="제목 1">
+            <a:extLst>
+              <a:ext uri="{FF2B5EF4-FFF2-40B4-BE49-F238E27FC236}">
+                <a16:creationId xmlns:a16="http://schemas.microsoft.com/office/drawing/2014/main" id="{C669018C-8CE6-6612-2B3E-818BFF6334A2}"/>
+              </a:ext>
+            </a:extLst>
+          </p:cNvPr>
+          <p:cNvSpPr>
+            <a:spLocks noGrp="1"/>
+          </p:cNvSpPr>
+          <p:nvPr>
+            <p:ph type="title"/>
+          </p:nvPr>
+        </p:nvSpPr>
+        <p:spPr>
+          <a:xfrm>
+            <a:off x="465082" y="124620"/>
+            <a:ext cx="10515600" cy="1325563"/>
+          </a:xfrm>
+        </p:spPr>
+        <p:txBody>
+          <a:bodyPr/>
+          <a:lstStyle/>
+          <a:p>
+            <a:r>
+              <a:rPr kumimoji="1" lang="ko-Kore-KR" altLang="en-US" dirty="0">
+                <a:solidFill>
+                  <a:schemeClr val="bg1">
+                    <a:lumMod val="95000"/>
+                  </a:schemeClr>
+                </a:solidFill>
+              </a:rPr>
+              <a:t>버퍼</a:t>
+            </a:r>
+            <a:r>
+              <a:rPr kumimoji="1" lang="ko-KR" altLang="en-US" dirty="0">
+                <a:solidFill>
+                  <a:schemeClr val="bg1">
+                    <a:lumMod val="95000"/>
+                  </a:schemeClr>
+                </a:solidFill>
+              </a:rPr>
+              <a:t> 사용 이유</a:t>
+            </a:r>
+            <a:endParaRPr kumimoji="1" lang="ko-Kore-KR" altLang="en-US" dirty="0">
+              <a:solidFill>
+                <a:schemeClr val="bg1">
+                  <a:lumMod val="95000"/>
+                </a:schemeClr>
+              </a:solidFill>
+            </a:endParaRPr>
+          </a:p>
+        </p:txBody>
+      </p:sp>
+      <p:sp>
+        <p:nvSpPr>
+          <p:cNvPr id="4" name="타원 3">
+            <a:extLst>
+              <a:ext uri="{FF2B5EF4-FFF2-40B4-BE49-F238E27FC236}">
+                <a16:creationId xmlns:a16="http://schemas.microsoft.com/office/drawing/2014/main" id="{7F4D9EAC-33E6-6D86-A2B0-E4691E0276BD}"/>
+              </a:ext>
+            </a:extLst>
+          </p:cNvPr>
+          <p:cNvSpPr/>
+          <p:nvPr/>
+        </p:nvSpPr>
+        <p:spPr>
+          <a:xfrm>
+            <a:off x="94593" y="2183524"/>
+            <a:ext cx="1881352" cy="1881352"/>
+          </a:xfrm>
+          <a:prstGeom prst="ellipse">
+            <a:avLst/>
+          </a:prstGeom>
+        </p:spPr>
+        <p:style>
+          <a:lnRef idx="2">
+            <a:schemeClr val="accent1">
+              <a:shade val="50000"/>
+            </a:schemeClr>
+          </a:lnRef>
+          <a:fillRef idx="1">
+            <a:schemeClr val="accent1"/>
+          </a:fillRef>
+          <a:effectRef idx="0">
+            <a:schemeClr val="accent1"/>
+          </a:effectRef>
+          <a:fontRef idx="minor">
+            <a:schemeClr val="lt1"/>
+          </a:fontRef>
+        </p:style>
+        <p:txBody>
+          <a:bodyPr rtlCol="0" anchor="ctr"/>
+          <a:lstStyle/>
+          <a:p>
+            <a:pPr algn="ctr"/>
+            <a:r>
+              <a:rPr kumimoji="1" lang="en-US" altLang="ko-Kore-KR" dirty="0"/>
+              <a:t>Data</a:t>
+            </a:r>
+            <a:endParaRPr kumimoji="1" lang="ko-Kore-KR" altLang="en-US" dirty="0"/>
+          </a:p>
+        </p:txBody>
+      </p:sp>
+      <p:sp>
+        <p:nvSpPr>
+          <p:cNvPr id="5" name="원통[C] 4">
+            <a:extLst>
+              <a:ext uri="{FF2B5EF4-FFF2-40B4-BE49-F238E27FC236}">
+                <a16:creationId xmlns:a16="http://schemas.microsoft.com/office/drawing/2014/main" id="{87DA2280-BACB-49A2-0A65-DF1E67A55479}"/>
+              </a:ext>
+            </a:extLst>
+          </p:cNvPr>
+          <p:cNvSpPr/>
+          <p:nvPr/>
+        </p:nvSpPr>
+        <p:spPr>
+          <a:xfrm>
+            <a:off x="3652344" y="2504089"/>
+            <a:ext cx="3468414" cy="1240221"/>
+          </a:xfrm>
+          <a:prstGeom prst="can">
+            <a:avLst/>
+          </a:prstGeom>
+        </p:spPr>
+        <p:style>
+          <a:lnRef idx="2">
+            <a:schemeClr val="accent1">
+              <a:shade val="50000"/>
+            </a:schemeClr>
+          </a:lnRef>
+          <a:fillRef idx="1">
+            <a:schemeClr val="accent1"/>
+          </a:fillRef>
+          <a:effectRef idx="0">
+            <a:schemeClr val="accent1"/>
+          </a:effectRef>
+          <a:fontRef idx="minor">
+            <a:schemeClr val="lt1"/>
+          </a:fontRef>
+        </p:style>
+        <p:txBody>
+          <a:bodyPr rtlCol="0" anchor="ctr"/>
+          <a:lstStyle/>
+          <a:p>
+            <a:pPr algn="ctr"/>
+            <a:r>
+              <a:rPr kumimoji="1" lang="en-US" altLang="ko-Kore-KR" dirty="0"/>
+              <a:t>Buffer</a:t>
+            </a:r>
+            <a:endParaRPr kumimoji="1" lang="ko-Kore-KR" altLang="en-US" dirty="0"/>
+          </a:p>
+        </p:txBody>
+      </p:sp>
+      <p:sp>
+        <p:nvSpPr>
+          <p:cNvPr id="6" name="한쪽 모서리가 잘린 사각형 5">
+            <a:extLst>
+              <a:ext uri="{FF2B5EF4-FFF2-40B4-BE49-F238E27FC236}">
+                <a16:creationId xmlns:a16="http://schemas.microsoft.com/office/drawing/2014/main" id="{6CBA1C2A-5ADF-D256-942D-4628B6DD78AB}"/>
+              </a:ext>
+            </a:extLst>
+          </p:cNvPr>
+          <p:cNvSpPr/>
+          <p:nvPr/>
+        </p:nvSpPr>
+        <p:spPr>
+          <a:xfrm>
+            <a:off x="9900745" y="1690688"/>
+            <a:ext cx="2196662" cy="2921876"/>
+          </a:xfrm>
+          <a:prstGeom prst="snip1Rect">
+            <a:avLst/>
+          </a:prstGeom>
+        </p:spPr>
+        <p:style>
+          <a:lnRef idx="2">
+            <a:schemeClr val="accent1">
+              <a:shade val="50000"/>
+            </a:schemeClr>
+          </a:lnRef>
+          <a:fillRef idx="1">
+            <a:schemeClr val="accent1"/>
+          </a:fillRef>
+          <a:effectRef idx="0">
+            <a:schemeClr val="accent1"/>
+          </a:effectRef>
+          <a:fontRef idx="minor">
+            <a:schemeClr val="lt1"/>
+          </a:fontRef>
+        </p:style>
+        <p:txBody>
+          <a:bodyPr rtlCol="0" anchor="ctr"/>
+          <a:lstStyle/>
+          <a:p>
+            <a:pPr algn="ctr"/>
+            <a:r>
+              <a:rPr kumimoji="1" lang="en-US" altLang="ko-Kore-KR" dirty="0"/>
+              <a:t>File</a:t>
+            </a:r>
+            <a:endParaRPr kumimoji="1" lang="ko-Kore-KR" altLang="en-US" dirty="0"/>
+          </a:p>
+        </p:txBody>
+      </p:sp>
+      <p:cxnSp>
+        <p:nvCxnSpPr>
+          <p:cNvPr id="8" name="직선 화살표 연결선 7">
+            <a:extLst>
+              <a:ext uri="{FF2B5EF4-FFF2-40B4-BE49-F238E27FC236}">
+                <a16:creationId xmlns:a16="http://schemas.microsoft.com/office/drawing/2014/main" id="{2768625D-1A8F-5BE5-20EE-FDCDB1BF86F3}"/>
+              </a:ext>
+            </a:extLst>
+          </p:cNvPr>
+          <p:cNvCxnSpPr>
+            <a:stCxn id="4" idx="6"/>
+            <a:endCxn id="5" idx="2"/>
+          </p:cNvCxnSpPr>
+          <p:nvPr/>
+        </p:nvCxnSpPr>
+        <p:spPr>
+          <a:xfrm>
+            <a:off x="1975945" y="3124200"/>
+            <a:ext cx="1676399" cy="0"/>
+          </a:xfrm>
+          <a:prstGeom prst="straightConnector1">
+            <a:avLst/>
+          </a:prstGeom>
+          <a:ln>
+            <a:tailEnd type="triangle"/>
+          </a:ln>
+        </p:spPr>
+        <p:style>
+          <a:lnRef idx="3">
+            <a:schemeClr val="accent1"/>
+          </a:lnRef>
+          <a:fillRef idx="0">
+            <a:schemeClr val="accent1"/>
+          </a:fillRef>
+          <a:effectRef idx="2">
+            <a:schemeClr val="accent1"/>
+          </a:effectRef>
+          <a:fontRef idx="minor">
+            <a:schemeClr val="tx1"/>
+          </a:fontRef>
+        </p:style>
+      </p:cxnSp>
+      <p:cxnSp>
+        <p:nvCxnSpPr>
+          <p:cNvPr id="9" name="직선 화살표 연결선 8">
+            <a:extLst>
+              <a:ext uri="{FF2B5EF4-FFF2-40B4-BE49-F238E27FC236}">
+                <a16:creationId xmlns:a16="http://schemas.microsoft.com/office/drawing/2014/main" id="{A8EE87AC-72B1-65A6-9096-AC459DB39971}"/>
+              </a:ext>
+            </a:extLst>
+          </p:cNvPr>
+          <p:cNvCxnSpPr>
+            <a:cxnSpLocks/>
+            <a:stCxn id="5" idx="4"/>
+            <a:endCxn id="6" idx="2"/>
+          </p:cNvCxnSpPr>
+          <p:nvPr/>
+        </p:nvCxnSpPr>
+        <p:spPr>
+          <a:xfrm>
+            <a:off x="7120758" y="3124200"/>
+            <a:ext cx="2779987" cy="27426"/>
+          </a:xfrm>
+          <a:prstGeom prst="straightConnector1">
+            <a:avLst/>
+          </a:prstGeom>
+          <a:ln>
+            <a:tailEnd type="triangle"/>
+          </a:ln>
+        </p:spPr>
+        <p:style>
+          <a:lnRef idx="3">
+            <a:schemeClr val="accent1"/>
+          </a:lnRef>
+          <a:fillRef idx="0">
+            <a:schemeClr val="accent1"/>
+          </a:fillRef>
+          <a:effectRef idx="2">
+            <a:schemeClr val="accent1"/>
+          </a:effectRef>
+          <a:fontRef idx="minor">
+            <a:schemeClr val="tx1"/>
+          </a:fontRef>
+        </p:style>
+      </p:cxnSp>
+      <p:sp>
+        <p:nvSpPr>
+          <p:cNvPr id="13" name="TextBox 12">
+            <a:extLst>
+              <a:ext uri="{FF2B5EF4-FFF2-40B4-BE49-F238E27FC236}">
+                <a16:creationId xmlns:a16="http://schemas.microsoft.com/office/drawing/2014/main" id="{99DAC224-CA17-8D84-B162-7EB1894D14EA}"/>
+              </a:ext>
+            </a:extLst>
+          </p:cNvPr>
+          <p:cNvSpPr txBox="1"/>
+          <p:nvPr/>
+        </p:nvSpPr>
+        <p:spPr>
+          <a:xfrm>
+            <a:off x="2446282" y="1752440"/>
+            <a:ext cx="735724" cy="369332"/>
+          </a:xfrm>
+          <a:prstGeom prst="rect">
+            <a:avLst/>
+          </a:prstGeom>
+        </p:spPr>
+        <p:style>
+          <a:lnRef idx="2">
+            <a:schemeClr val="accent1"/>
+          </a:lnRef>
+          <a:fillRef idx="1">
+            <a:schemeClr val="lt1"/>
+          </a:fillRef>
+          <a:effectRef idx="0">
+            <a:schemeClr val="accent1"/>
+          </a:effectRef>
+          <a:fontRef idx="minor">
+            <a:schemeClr val="dk1"/>
+          </a:fontRef>
+        </p:style>
+        <p:txBody>
+          <a:bodyPr wrap="square" rtlCol="0">
+            <a:spAutoFit/>
+          </a:bodyPr>
+          <a:lstStyle/>
+          <a:p>
+            <a:pPr algn="ctr"/>
+            <a:r>
+              <a:rPr kumimoji="1" lang="ko-Kore-KR" altLang="en-US" dirty="0"/>
+              <a:t>출력</a:t>
+            </a:r>
+          </a:p>
+        </p:txBody>
+      </p:sp>
+      <p:sp>
+        <p:nvSpPr>
+          <p:cNvPr id="14" name="TextBox 13">
+            <a:extLst>
+              <a:ext uri="{FF2B5EF4-FFF2-40B4-BE49-F238E27FC236}">
+                <a16:creationId xmlns:a16="http://schemas.microsoft.com/office/drawing/2014/main" id="{0B43912E-021B-DA4D-B462-F9756A73C003}"/>
+              </a:ext>
+            </a:extLst>
+          </p:cNvPr>
+          <p:cNvSpPr txBox="1"/>
+          <p:nvPr/>
+        </p:nvSpPr>
+        <p:spPr>
+          <a:xfrm>
+            <a:off x="5018689" y="4064876"/>
+            <a:ext cx="735724" cy="369332"/>
+          </a:xfrm>
+          <a:prstGeom prst="rect">
+            <a:avLst/>
+          </a:prstGeom>
+        </p:spPr>
+        <p:style>
+          <a:lnRef idx="2">
+            <a:schemeClr val="accent1"/>
+          </a:lnRef>
+          <a:fillRef idx="1">
+            <a:schemeClr val="lt1"/>
+          </a:fillRef>
+          <a:effectRef idx="0">
+            <a:schemeClr val="accent1"/>
+          </a:effectRef>
+          <a:fontRef idx="minor">
+            <a:schemeClr val="dk1"/>
+          </a:fontRef>
+        </p:style>
+        <p:txBody>
+          <a:bodyPr wrap="square" rtlCol="0">
+            <a:spAutoFit/>
+          </a:bodyPr>
+          <a:lstStyle/>
+          <a:p>
+            <a:pPr algn="ctr"/>
+            <a:r>
+              <a:rPr kumimoji="1" lang="en-US" altLang="ko-Kore-KR" dirty="0"/>
+              <a:t>RAM</a:t>
+            </a:r>
+            <a:endParaRPr kumimoji="1" lang="ko-Kore-KR" altLang="en-US" dirty="0"/>
+          </a:p>
+        </p:txBody>
+      </p:sp>
+      <p:sp>
+        <p:nvSpPr>
+          <p:cNvPr id="16" name="TextBox 15">
+            <a:extLst>
+              <a:ext uri="{FF2B5EF4-FFF2-40B4-BE49-F238E27FC236}">
+                <a16:creationId xmlns:a16="http://schemas.microsoft.com/office/drawing/2014/main" id="{14960362-FBBD-DA08-B6D7-C3DFC058DEFA}"/>
+              </a:ext>
+            </a:extLst>
+          </p:cNvPr>
+          <p:cNvSpPr txBox="1"/>
+          <p:nvPr/>
+        </p:nvSpPr>
+        <p:spPr>
+          <a:xfrm>
+            <a:off x="10612820" y="4815221"/>
+            <a:ext cx="735724" cy="369332"/>
+          </a:xfrm>
+          <a:prstGeom prst="rect">
+            <a:avLst/>
+          </a:prstGeom>
+        </p:spPr>
+        <p:style>
+          <a:lnRef idx="2">
+            <a:schemeClr val="accent1"/>
+          </a:lnRef>
+          <a:fillRef idx="1">
+            <a:schemeClr val="lt1"/>
+          </a:fillRef>
+          <a:effectRef idx="0">
+            <a:schemeClr val="accent1"/>
+          </a:effectRef>
+          <a:fontRef idx="minor">
+            <a:schemeClr val="dk1"/>
+          </a:fontRef>
+        </p:style>
+        <p:txBody>
+          <a:bodyPr wrap="square" rtlCol="0">
+            <a:spAutoFit/>
+          </a:bodyPr>
+          <a:lstStyle/>
+          <a:p>
+            <a:pPr algn="ctr"/>
+            <a:r>
+              <a:rPr kumimoji="1" lang="en-US" altLang="ko-Kore-KR" dirty="0"/>
+              <a:t>HDD</a:t>
+            </a:r>
+            <a:endParaRPr kumimoji="1" lang="ko-Kore-KR" altLang="en-US" dirty="0"/>
+          </a:p>
+        </p:txBody>
+      </p:sp>
+      <p:sp>
+        <p:nvSpPr>
+          <p:cNvPr id="17" name="TextBox 16">
+            <a:extLst>
+              <a:ext uri="{FF2B5EF4-FFF2-40B4-BE49-F238E27FC236}">
+                <a16:creationId xmlns:a16="http://schemas.microsoft.com/office/drawing/2014/main" id="{B3EB50BF-9A47-AD8D-CD95-57D37F201050}"/>
+              </a:ext>
+            </a:extLst>
+          </p:cNvPr>
+          <p:cNvSpPr txBox="1"/>
+          <p:nvPr/>
+        </p:nvSpPr>
+        <p:spPr>
+          <a:xfrm>
+            <a:off x="1621219" y="4726452"/>
+            <a:ext cx="2385849" cy="646331"/>
+          </a:xfrm>
+          <a:prstGeom prst="rect">
+            <a:avLst/>
+          </a:prstGeom>
+        </p:spPr>
+        <p:style>
+          <a:lnRef idx="2">
+            <a:schemeClr val="accent4"/>
+          </a:lnRef>
+          <a:fillRef idx="1">
+            <a:schemeClr val="lt1"/>
+          </a:fillRef>
+          <a:effectRef idx="0">
+            <a:schemeClr val="accent4"/>
+          </a:effectRef>
+          <a:fontRef idx="minor">
+            <a:schemeClr val="dk1"/>
+          </a:fontRef>
+        </p:style>
+        <p:txBody>
+          <a:bodyPr wrap="square" rtlCol="0">
+            <a:spAutoFit/>
+          </a:bodyPr>
+          <a:lstStyle/>
+          <a:p>
+            <a:r>
+              <a:rPr kumimoji="1" lang="ko-Kore-KR" altLang="en-US" dirty="0"/>
+              <a:t>출력할</a:t>
+            </a:r>
+            <a:r>
+              <a:rPr kumimoji="1" lang="ko-KR" altLang="en-US" dirty="0"/>
+              <a:t> 데이터를 </a:t>
+            </a:r>
+            <a:r>
+              <a:rPr kumimoji="1" lang="en-US" altLang="ko-KR" dirty="0"/>
+              <a:t>RAM</a:t>
+            </a:r>
+            <a:r>
+              <a:rPr kumimoji="1" lang="ko-KR" altLang="en-US" dirty="0"/>
+              <a:t>에 모아두었다가</a:t>
+            </a:r>
+            <a:endParaRPr kumimoji="1" lang="ko-Kore-KR" altLang="en-US" dirty="0"/>
+          </a:p>
+        </p:txBody>
+      </p:sp>
+      <p:cxnSp>
+        <p:nvCxnSpPr>
+          <p:cNvPr id="19" name="직선 화살표 연결선 18">
+            <a:extLst>
+              <a:ext uri="{FF2B5EF4-FFF2-40B4-BE49-F238E27FC236}">
+                <a16:creationId xmlns:a16="http://schemas.microsoft.com/office/drawing/2014/main" id="{1630D50B-15E7-1DC7-5D0C-05E2FC4ADAAD}"/>
+              </a:ext>
+            </a:extLst>
+          </p:cNvPr>
+          <p:cNvCxnSpPr>
+            <a:stCxn id="17" idx="0"/>
+            <a:endCxn id="13" idx="2"/>
+          </p:cNvCxnSpPr>
+          <p:nvPr/>
+        </p:nvCxnSpPr>
+        <p:spPr>
+          <a:xfrm flipV="1">
+            <a:off x="2814144" y="2121772"/>
+            <a:ext cx="0" cy="2604680"/>
+          </a:xfrm>
+          <a:prstGeom prst="straightConnector1">
+            <a:avLst/>
+          </a:prstGeom>
+          <a:ln>
+            <a:tailEnd type="triangle"/>
+          </a:ln>
+        </p:spPr>
+        <p:style>
+          <a:lnRef idx="3">
+            <a:schemeClr val="accent4"/>
+          </a:lnRef>
+          <a:fillRef idx="0">
+            <a:schemeClr val="accent4"/>
+          </a:fillRef>
+          <a:effectRef idx="2">
+            <a:schemeClr val="accent4"/>
+          </a:effectRef>
+          <a:fontRef idx="minor">
+            <a:schemeClr val="tx1"/>
+          </a:fontRef>
+        </p:style>
+      </p:cxnSp>
+      <p:sp>
+        <p:nvSpPr>
+          <p:cNvPr id="21" name="TextBox 20">
+            <a:extLst>
+              <a:ext uri="{FF2B5EF4-FFF2-40B4-BE49-F238E27FC236}">
+                <a16:creationId xmlns:a16="http://schemas.microsoft.com/office/drawing/2014/main" id="{6D188164-2645-B066-EF63-2BB112B7629E}"/>
+              </a:ext>
+            </a:extLst>
+          </p:cNvPr>
+          <p:cNvSpPr txBox="1"/>
+          <p:nvPr/>
+        </p:nvSpPr>
+        <p:spPr>
+          <a:xfrm>
+            <a:off x="6533492" y="5140432"/>
+            <a:ext cx="3673367" cy="923330"/>
+          </a:xfrm>
+          <a:prstGeom prst="rect">
+            <a:avLst/>
+          </a:prstGeom>
+        </p:spPr>
+        <p:style>
+          <a:lnRef idx="2">
+            <a:schemeClr val="accent4"/>
+          </a:lnRef>
+          <a:fillRef idx="1">
+            <a:schemeClr val="lt1"/>
+          </a:fillRef>
+          <a:effectRef idx="0">
+            <a:schemeClr val="accent4"/>
+          </a:effectRef>
+          <a:fontRef idx="minor">
+            <a:schemeClr val="dk1"/>
+          </a:fontRef>
+        </p:style>
+        <p:txBody>
+          <a:bodyPr wrap="square" rtlCol="0">
+            <a:spAutoFit/>
+          </a:bodyPr>
+          <a:lstStyle/>
+          <a:p>
+            <a:r>
+              <a:rPr kumimoji="1" lang="en-US" altLang="ko-Kore-KR" dirty="0"/>
+              <a:t>RAM</a:t>
+            </a:r>
+            <a:r>
+              <a:rPr kumimoji="1" lang="ko-KR" altLang="en-US" dirty="0"/>
+              <a:t>이 꽉 차면</a:t>
+            </a:r>
+            <a:r>
+              <a:rPr kumimoji="1" lang="en-US" altLang="ko-KR" dirty="0"/>
+              <a:t>,</a:t>
+            </a:r>
+          </a:p>
+          <a:p>
+            <a:r>
+              <a:rPr kumimoji="1" lang="en-US" altLang="ko-Kore-KR" dirty="0"/>
+              <a:t>HDD</a:t>
+            </a:r>
+            <a:r>
+              <a:rPr kumimoji="1" lang="ko-KR" altLang="en-US" dirty="0"/>
+              <a:t>로 출력함으로써</a:t>
+            </a:r>
+            <a:endParaRPr kumimoji="1" lang="en-US" altLang="ko-KR" dirty="0"/>
+          </a:p>
+          <a:p>
+            <a:r>
+              <a:rPr kumimoji="1" lang="ko-KR" altLang="en-US" dirty="0"/>
+              <a:t>입출력에 소요되는 시간을 줄인다</a:t>
+            </a:r>
+            <a:r>
+              <a:rPr kumimoji="1" lang="en-US" altLang="ko-KR" dirty="0"/>
+              <a:t>.</a:t>
+            </a:r>
+            <a:endParaRPr kumimoji="1" lang="ko-Kore-KR" altLang="en-US" dirty="0"/>
+          </a:p>
+        </p:txBody>
+      </p:sp>
+      <p:cxnSp>
+        <p:nvCxnSpPr>
+          <p:cNvPr id="22" name="직선 화살표 연결선 21">
+            <a:extLst>
+              <a:ext uri="{FF2B5EF4-FFF2-40B4-BE49-F238E27FC236}">
+                <a16:creationId xmlns:a16="http://schemas.microsoft.com/office/drawing/2014/main" id="{16051706-9783-86A2-E45C-62CA8DFE14A9}"/>
+              </a:ext>
+            </a:extLst>
+          </p:cNvPr>
+          <p:cNvCxnSpPr>
+            <a:cxnSpLocks/>
+            <a:stCxn id="21" idx="0"/>
+            <a:endCxn id="26" idx="2"/>
+          </p:cNvCxnSpPr>
+          <p:nvPr/>
+        </p:nvCxnSpPr>
+        <p:spPr>
+          <a:xfrm flipV="1">
+            <a:off x="8370176" y="2260272"/>
+            <a:ext cx="0" cy="2880160"/>
+          </a:xfrm>
+          <a:prstGeom prst="straightConnector1">
+            <a:avLst/>
+          </a:prstGeom>
+          <a:ln>
+            <a:tailEnd type="triangle"/>
+          </a:ln>
+        </p:spPr>
+        <p:style>
+          <a:lnRef idx="3">
+            <a:schemeClr val="accent4"/>
+          </a:lnRef>
+          <a:fillRef idx="0">
+            <a:schemeClr val="accent4"/>
+          </a:fillRef>
+          <a:effectRef idx="2">
+            <a:schemeClr val="accent4"/>
+          </a:effectRef>
+          <a:fontRef idx="minor">
+            <a:schemeClr val="tx1"/>
+          </a:fontRef>
+        </p:style>
+      </p:cxnSp>
+      <p:sp>
+        <p:nvSpPr>
+          <p:cNvPr id="26" name="TextBox 25">
+            <a:extLst>
+              <a:ext uri="{FF2B5EF4-FFF2-40B4-BE49-F238E27FC236}">
+                <a16:creationId xmlns:a16="http://schemas.microsoft.com/office/drawing/2014/main" id="{88526DF9-3C43-E67D-8334-EB9AE51A6CE4}"/>
+              </a:ext>
+            </a:extLst>
+          </p:cNvPr>
+          <p:cNvSpPr txBox="1"/>
+          <p:nvPr/>
+        </p:nvSpPr>
+        <p:spPr>
+          <a:xfrm>
+            <a:off x="6980183" y="1613941"/>
+            <a:ext cx="2779985" cy="646331"/>
+          </a:xfrm>
+          <a:prstGeom prst="rect">
+            <a:avLst/>
+          </a:prstGeom>
+        </p:spPr>
+        <p:style>
+          <a:lnRef idx="2">
+            <a:schemeClr val="accent1"/>
+          </a:lnRef>
+          <a:fillRef idx="1">
+            <a:schemeClr val="lt1"/>
+          </a:fillRef>
+          <a:effectRef idx="0">
+            <a:schemeClr val="accent1"/>
+          </a:effectRef>
+          <a:fontRef idx="minor">
+            <a:schemeClr val="dk1"/>
+          </a:fontRef>
+        </p:style>
+        <p:txBody>
+          <a:bodyPr wrap="square" rtlCol="0">
+            <a:spAutoFit/>
+          </a:bodyPr>
+          <a:lstStyle/>
+          <a:p>
+            <a:pPr algn="ctr"/>
+            <a:r>
+              <a:rPr kumimoji="1" lang="ko-KR" altLang="en-US" dirty="0"/>
+              <a:t>버퍼가 </a:t>
+            </a:r>
+            <a:r>
+              <a:rPr kumimoji="1" lang="ko-KR" altLang="en-US" dirty="0" err="1"/>
+              <a:t>꽉차면</a:t>
+            </a:r>
+            <a:r>
+              <a:rPr kumimoji="1" lang="en-US" altLang="ko-KR" dirty="0"/>
+              <a:t>,</a:t>
+            </a:r>
+          </a:p>
+          <a:p>
+            <a:pPr algn="ctr"/>
+            <a:r>
+              <a:rPr kumimoji="1" lang="ko-KR" altLang="en-US" dirty="0"/>
+              <a:t>실제 파일로 출력</a:t>
+            </a:r>
+            <a:endParaRPr kumimoji="1" lang="ko-Kore-KR" altLang="en-US" dirty="0"/>
+          </a:p>
+        </p:txBody>
+      </p:sp>
+      <p:cxnSp>
+        <p:nvCxnSpPr>
+          <p:cNvPr id="32" name="구부러진 연결선[U] 31">
+            <a:extLst>
+              <a:ext uri="{FF2B5EF4-FFF2-40B4-BE49-F238E27FC236}">
+                <a16:creationId xmlns:a16="http://schemas.microsoft.com/office/drawing/2014/main" id="{C4D47B8E-98CE-48D4-F220-1CF2297128F4}"/>
+              </a:ext>
+            </a:extLst>
+          </p:cNvPr>
+          <p:cNvCxnSpPr>
+            <a:stCxn id="4" idx="0"/>
+            <a:endCxn id="6" idx="3"/>
+          </p:cNvCxnSpPr>
+          <p:nvPr/>
+        </p:nvCxnSpPr>
+        <p:spPr>
+          <a:xfrm rot="5400000" flipH="1" flipV="1">
+            <a:off x="5770754" y="-3044797"/>
+            <a:ext cx="492836" cy="9963807"/>
+          </a:xfrm>
+          <a:prstGeom prst="curvedConnector3">
+            <a:avLst>
+              <a:gd name="adj1" fmla="val 169844"/>
+            </a:avLst>
+          </a:prstGeom>
+          <a:ln>
+            <a:tailEnd type="triangle"/>
+          </a:ln>
+        </p:spPr>
+        <p:style>
+          <a:lnRef idx="3">
+            <a:schemeClr val="accent2"/>
+          </a:lnRef>
+          <a:fillRef idx="0">
+            <a:schemeClr val="accent2"/>
+          </a:fillRef>
+          <a:effectRef idx="2">
+            <a:schemeClr val="accent2"/>
+          </a:effectRef>
+          <a:fontRef idx="minor">
+            <a:schemeClr val="tx1"/>
+          </a:fontRef>
+        </p:style>
+      </p:cxnSp>
+      <p:sp>
+        <p:nvSpPr>
+          <p:cNvPr id="34" name="TextBox 33">
+            <a:extLst>
+              <a:ext uri="{FF2B5EF4-FFF2-40B4-BE49-F238E27FC236}">
+                <a16:creationId xmlns:a16="http://schemas.microsoft.com/office/drawing/2014/main" id="{F5AAF1DE-80CB-F200-1002-D20003EB5FC4}"/>
+              </a:ext>
+            </a:extLst>
+          </p:cNvPr>
+          <p:cNvSpPr txBox="1"/>
+          <p:nvPr/>
+        </p:nvSpPr>
+        <p:spPr>
+          <a:xfrm>
+            <a:off x="5728138" y="843240"/>
+            <a:ext cx="735724" cy="369332"/>
+          </a:xfrm>
+          <a:prstGeom prst="rect">
+            <a:avLst/>
+          </a:prstGeom>
+        </p:spPr>
+        <p:style>
+          <a:lnRef idx="2">
+            <a:schemeClr val="accent2"/>
+          </a:lnRef>
+          <a:fillRef idx="1">
+            <a:schemeClr val="lt1"/>
+          </a:fillRef>
+          <a:effectRef idx="0">
+            <a:schemeClr val="accent2"/>
+          </a:effectRef>
+          <a:fontRef idx="minor">
+            <a:schemeClr val="dk1"/>
+          </a:fontRef>
+        </p:style>
+        <p:txBody>
+          <a:bodyPr wrap="square" rtlCol="0">
+            <a:spAutoFit/>
+          </a:bodyPr>
+          <a:lstStyle/>
+          <a:p>
+            <a:pPr algn="ctr"/>
+            <a:r>
+              <a:rPr kumimoji="1" lang="ko-Kore-KR" altLang="en-US" dirty="0"/>
+              <a:t>출력</a:t>
+            </a:r>
+          </a:p>
+        </p:txBody>
+      </p:sp>
+      <p:sp>
+        <p:nvSpPr>
+          <p:cNvPr id="35" name="곱하기 34">
+            <a:extLst>
+              <a:ext uri="{FF2B5EF4-FFF2-40B4-BE49-F238E27FC236}">
+                <a16:creationId xmlns:a16="http://schemas.microsoft.com/office/drawing/2014/main" id="{360D62A7-F0C7-1CFC-8462-9826442087D5}"/>
+              </a:ext>
+            </a:extLst>
+          </p:cNvPr>
+          <p:cNvSpPr/>
+          <p:nvPr/>
+        </p:nvSpPr>
+        <p:spPr>
+          <a:xfrm>
+            <a:off x="5155324" y="499519"/>
+            <a:ext cx="1881352" cy="1116834"/>
+          </a:xfrm>
+          <a:prstGeom prst="mathMultiply">
+            <a:avLst/>
+          </a:prstGeom>
+          <a:solidFill>
+            <a:srgbClr val="FDA9F7">
+              <a:alpha val="55911"/>
+            </a:srgbClr>
+          </a:solidFill>
+        </p:spPr>
+        <p:style>
+          <a:lnRef idx="2">
+            <a:schemeClr val="accent1">
+              <a:shade val="50000"/>
+            </a:schemeClr>
+          </a:lnRef>
+          <a:fillRef idx="1">
+            <a:schemeClr val="accent1"/>
+          </a:fillRef>
+          <a:effectRef idx="0">
+            <a:schemeClr val="accent1"/>
+          </a:effectRef>
+          <a:fontRef idx="minor">
+            <a:schemeClr val="lt1"/>
+          </a:fontRef>
+        </p:style>
+        <p:txBody>
+          <a:bodyPr rtlCol="0" anchor="ctr"/>
+          <a:lstStyle/>
+          <a:p>
+            <a:pPr algn="ctr"/>
+            <a:endParaRPr kumimoji="1" lang="ko-Kore-KR" altLang="en-US" dirty="0"/>
+          </a:p>
+        </p:txBody>
+      </p:sp>
+    </p:spTree>
+    <p:extLst>
+      <p:ext uri="{BB962C8B-B14F-4D97-AF65-F5344CB8AC3E}">
+        <p14:creationId xmlns:p14="http://schemas.microsoft.com/office/powerpoint/2010/main" val="1577065723"/>
       </p:ext>
     </p:extLst>
   </p:cSld>

</xml_diff>